<commit_message>
added api get & post in Lecture-29
</commit_message>
<xml_diff>
--- a/Lecture-28/Lecture-28.pptx
+++ b/Lecture-28/Lecture-28.pptx
@@ -854,7 +854,12 @@
             <p:ph type="sldImg"/>
           </p:nvPr>
         </p:nvSpPr>
-        <p:spPr/>
+        <p:spPr>
+          <a:xfrm>
+            <a:off x="381000" y="685800"/>
+            <a:ext cx="6096000" cy="3429000"/>
+          </a:xfrm>
+        </p:spPr>
       </p:sp>
       <p:sp>
         <p:nvSpPr>
@@ -1855,7 +1860,12 @@
             <p:ph type="sldImg"/>
           </p:nvPr>
         </p:nvSpPr>
-        <p:spPr/>
+        <p:spPr>
+          <a:xfrm>
+            <a:off x="381000" y="685800"/>
+            <a:ext cx="6096000" cy="3429000"/>
+          </a:xfrm>
+        </p:spPr>
       </p:sp>
       <p:sp>
         <p:nvSpPr>
@@ -10888,7 +10898,7 @@
           <a:p>
             <a:fld id="{7E3D4EF1-0385-43D3-A179-699E3F2FE344}" type="datetime1">
               <a:rPr lang="en-IN" smtClean="0"/>
-              <a:t>16-11-2024</a:t>
+              <a:t>21-11-2024</a:t>
             </a:fld>
             <a:endParaRPr lang="en-IN" dirty="0"/>
           </a:p>
@@ -19381,8 +19391,8 @@
         </p:nvSpPr>
         <p:spPr>
           <a:xfrm>
-            <a:off x="3992605" y="2284599"/>
-            <a:ext cx="1853294" cy="1169389"/>
+            <a:off x="3992605" y="2261514"/>
+            <a:ext cx="1853294" cy="1192475"/>
           </a:xfrm>
           <a:prstGeom prst="ellipse">
             <a:avLst/>
@@ -19645,6 +19655,7 @@
             </a:extLst>
           </p:cNvPr>
           <p:cNvCxnSpPr>
+            <a:cxnSpLocks/>
             <a:stCxn id="22" idx="4"/>
             <a:endCxn id="24" idx="0"/>
           </p:cNvCxnSpPr>
@@ -19652,8 +19663,8 @@
         </p:nvCxnSpPr>
         <p:spPr>
           <a:xfrm>
-            <a:off x="4919253" y="3453988"/>
-            <a:ext cx="1" cy="419668"/>
+            <a:off x="4919252" y="3453989"/>
+            <a:ext cx="2" cy="419666"/>
           </a:xfrm>
           <a:prstGeom prst="straightConnector1">
             <a:avLst/>
@@ -19735,15 +19746,15 @@
             </a:extLst>
           </p:cNvPr>
           <p:cNvCxnSpPr>
-            <a:stCxn id="22" idx="0"/>
-            <a:endCxn id="23" idx="2"/>
+            <a:cxnSpLocks/>
+            <a:endCxn id="22" idx="0"/>
           </p:cNvCxnSpPr>
           <p:nvPr/>
         </p:nvCxnSpPr>
         <p:spPr>
-          <a:xfrm flipV="1">
-            <a:off x="4919253" y="1806505"/>
-            <a:ext cx="1" cy="478094"/>
+          <a:xfrm flipH="1">
+            <a:off x="4919252" y="1834905"/>
+            <a:ext cx="2407" cy="426609"/>
           </a:xfrm>
           <a:prstGeom prst="straightConnector1">
             <a:avLst/>

</xml_diff>